<commit_message>
Demo, Report, Deployment link added.
</commit_message>
<xml_diff>
--- a/Osteoarthritis Checkup System.pptx
+++ b/Osteoarthritis Checkup System.pptx
@@ -17,8 +17,9 @@
     <p:sldId id="270" r:id="rId11"/>
     <p:sldId id="265" r:id="rId12"/>
     <p:sldId id="266" r:id="rId13"/>
-    <p:sldId id="269" r:id="rId14"/>
-    <p:sldId id="267" r:id="rId15"/>
+    <p:sldId id="271" r:id="rId14"/>
+    <p:sldId id="269" r:id="rId15"/>
+    <p:sldId id="267" r:id="rId16"/>
   </p:sldIdLst>
   <p:sldSz cx="12192000" cy="6858000"/>
   <p:notesSz cx="6858000" cy="9144000"/>
@@ -351,7 +352,7 @@
           <a:p>
             <a:fld id="{C6C6A000-3B5C-4350-9EE9-B29FA644EC03}" type="datetimeFigureOut">
               <a:rPr lang="en-IN" smtClean="0"/>
-              <a:t>23-11-2020</a:t>
+              <a:t>18-12-2020</a:t>
             </a:fld>
             <a:endParaRPr lang="en-IN"/>
           </a:p>
@@ -559,7 +560,7 @@
           <a:p>
             <a:fld id="{C6C6A000-3B5C-4350-9EE9-B29FA644EC03}" type="datetimeFigureOut">
               <a:rPr lang="en-IN" smtClean="0"/>
-              <a:t>23-11-2020</a:t>
+              <a:t>18-12-2020</a:t>
             </a:fld>
             <a:endParaRPr lang="en-IN"/>
           </a:p>
@@ -815,7 +816,7 @@
           <a:p>
             <a:fld id="{C6C6A000-3B5C-4350-9EE9-B29FA644EC03}" type="datetimeFigureOut">
               <a:rPr lang="en-IN" smtClean="0"/>
-              <a:t>23-11-2020</a:t>
+              <a:t>18-12-2020</a:t>
             </a:fld>
             <a:endParaRPr lang="en-IN"/>
           </a:p>
@@ -989,7 +990,7 @@
           <a:p>
             <a:fld id="{C6C6A000-3B5C-4350-9EE9-B29FA644EC03}" type="datetimeFigureOut">
               <a:rPr lang="en-IN" smtClean="0"/>
-              <a:t>23-11-2020</a:t>
+              <a:t>18-12-2020</a:t>
             </a:fld>
             <a:endParaRPr lang="en-IN"/>
           </a:p>
@@ -1332,7 +1333,7 @@
           <a:p>
             <a:fld id="{C6C6A000-3B5C-4350-9EE9-B29FA644EC03}" type="datetimeFigureOut">
               <a:rPr lang="en-IN" smtClean="0"/>
-              <a:t>23-11-2020</a:t>
+              <a:t>18-12-2020</a:t>
             </a:fld>
             <a:endParaRPr lang="en-IN"/>
           </a:p>
@@ -1607,7 +1608,7 @@
           <a:p>
             <a:fld id="{C6C6A000-3B5C-4350-9EE9-B29FA644EC03}" type="datetimeFigureOut">
               <a:rPr lang="en-IN" smtClean="0"/>
-              <a:t>23-11-2020</a:t>
+              <a:t>18-12-2020</a:t>
             </a:fld>
             <a:endParaRPr lang="en-IN"/>
           </a:p>
@@ -1986,7 +1987,7 @@
           <a:p>
             <a:fld id="{C6C6A000-3B5C-4350-9EE9-B29FA644EC03}" type="datetimeFigureOut">
               <a:rPr lang="en-IN" smtClean="0"/>
-              <a:t>23-11-2020</a:t>
+              <a:t>18-12-2020</a:t>
             </a:fld>
             <a:endParaRPr lang="en-IN"/>
           </a:p>
@@ -2104,7 +2105,7 @@
           <a:p>
             <a:fld id="{C6C6A000-3B5C-4350-9EE9-B29FA644EC03}" type="datetimeFigureOut">
               <a:rPr lang="en-IN" smtClean="0"/>
-              <a:t>23-11-2020</a:t>
+              <a:t>18-12-2020</a:t>
             </a:fld>
             <a:endParaRPr lang="en-IN"/>
           </a:p>
@@ -2275,7 +2276,7 @@
           <a:p>
             <a:fld id="{C6C6A000-3B5C-4350-9EE9-B29FA644EC03}" type="datetimeFigureOut">
               <a:rPr lang="en-IN" smtClean="0"/>
-              <a:t>23-11-2020</a:t>
+              <a:t>18-12-2020</a:t>
             </a:fld>
             <a:endParaRPr lang="en-IN"/>
           </a:p>
@@ -2629,7 +2630,7 @@
           <a:p>
             <a:fld id="{C6C6A000-3B5C-4350-9EE9-B29FA644EC03}" type="datetimeFigureOut">
               <a:rPr lang="en-IN" smtClean="0"/>
-              <a:t>23-11-2020</a:t>
+              <a:t>18-12-2020</a:t>
             </a:fld>
             <a:endParaRPr lang="en-IN"/>
           </a:p>
@@ -3011,7 +3012,7 @@
           <a:p>
             <a:fld id="{C6C6A000-3B5C-4350-9EE9-B29FA644EC03}" type="datetimeFigureOut">
               <a:rPr lang="en-IN" smtClean="0"/>
-              <a:t>23-11-2020</a:t>
+              <a:t>18-12-2020</a:t>
             </a:fld>
             <a:endParaRPr lang="en-IN"/>
           </a:p>
@@ -3298,7 +3299,7 @@
           <a:p>
             <a:fld id="{C6C6A000-3B5C-4350-9EE9-B29FA644EC03}" type="datetimeFigureOut">
               <a:rPr lang="en-IN" smtClean="0"/>
-              <a:t>23-11-2020</a:t>
+              <a:t>18-12-2020</a:t>
             </a:fld>
             <a:endParaRPr lang="en-IN"/>
           </a:p>
@@ -4637,7 +4638,7 @@
           <p:nvPr>
             <p:extLst>
               <p:ext uri="{D42A27DB-BD31-4B8C-83A1-F6EECF244321}">
-                <p14:modId xmlns:p14="http://schemas.microsoft.com/office/powerpoint/2010/main" val="735768559"/>
+                <p14:modId xmlns:p14="http://schemas.microsoft.com/office/powerpoint/2010/main" val="2554454977"/>
               </p:ext>
             </p:extLst>
           </p:nvPr>
@@ -4908,6 +4909,104 @@
 </file>
 
 <file path=ppt/slides/slide13.xml><?xml version="1.0" encoding="utf-8"?>
+<p:sld xmlns:a="http://schemas.openxmlformats.org/drawingml/2006/main" xmlns:r="http://schemas.openxmlformats.org/officeDocument/2006/relationships" xmlns:p="http://schemas.openxmlformats.org/presentationml/2006/main">
+  <p:cSld>
+    <p:spTree>
+      <p:nvGrpSpPr>
+        <p:cNvPr id="1" name=""/>
+        <p:cNvGrpSpPr/>
+        <p:nvPr/>
+      </p:nvGrpSpPr>
+      <p:grpSpPr>
+        <a:xfrm>
+          <a:off x="0" y="0"/>
+          <a:ext cx="0" cy="0"/>
+          <a:chOff x="0" y="0"/>
+          <a:chExt cx="0" cy="0"/>
+        </a:xfrm>
+      </p:grpSpPr>
+      <p:pic>
+        <p:nvPicPr>
+          <p:cNvPr id="2" name="Picture 1">
+            <a:extLst>
+              <a:ext uri="{FF2B5EF4-FFF2-40B4-BE49-F238E27FC236}">
+                <a16:creationId xmlns:a16="http://schemas.microsoft.com/office/drawing/2014/main" id="{BBB9D9C3-5843-4658-B2D3-966538C43492}"/>
+              </a:ext>
+            </a:extLst>
+          </p:cNvPr>
+          <p:cNvPicPr/>
+          <p:nvPr/>
+        </p:nvPicPr>
+        <p:blipFill>
+          <a:blip r:embed="rId2">
+            <a:extLst>
+              <a:ext uri="{28A0092B-C50C-407E-A947-70E740481C1C}">
+                <a14:useLocalDpi xmlns:a14="http://schemas.microsoft.com/office/drawing/2010/main" val="0"/>
+              </a:ext>
+            </a:extLst>
+          </a:blip>
+          <a:stretch>
+            <a:fillRect/>
+          </a:stretch>
+        </p:blipFill>
+        <p:spPr>
+          <a:xfrm>
+            <a:off x="6462944" y="0"/>
+            <a:ext cx="5729056" cy="6337738"/>
+          </a:xfrm>
+          <a:prstGeom prst="rect">
+            <a:avLst/>
+          </a:prstGeom>
+        </p:spPr>
+      </p:pic>
+      <p:pic>
+        <p:nvPicPr>
+          <p:cNvPr id="3" name="Picture 2">
+            <a:extLst>
+              <a:ext uri="{FF2B5EF4-FFF2-40B4-BE49-F238E27FC236}">
+                <a16:creationId xmlns:a16="http://schemas.microsoft.com/office/drawing/2014/main" id="{9E9E75A3-CBFD-424F-A7C9-08F4EE80E12F}"/>
+              </a:ext>
+            </a:extLst>
+          </p:cNvPr>
+          <p:cNvPicPr/>
+          <p:nvPr/>
+        </p:nvPicPr>
+        <p:blipFill>
+          <a:blip r:embed="rId3">
+            <a:extLst>
+              <a:ext uri="{28A0092B-C50C-407E-A947-70E740481C1C}">
+                <a14:useLocalDpi xmlns:a14="http://schemas.microsoft.com/office/drawing/2010/main" val="0"/>
+              </a:ext>
+            </a:extLst>
+          </a:blip>
+          <a:stretch>
+            <a:fillRect/>
+          </a:stretch>
+        </p:blipFill>
+        <p:spPr>
+          <a:xfrm>
+            <a:off x="0" y="0"/>
+            <a:ext cx="6462944" cy="6337738"/>
+          </a:xfrm>
+          <a:prstGeom prst="rect">
+            <a:avLst/>
+          </a:prstGeom>
+        </p:spPr>
+      </p:pic>
+    </p:spTree>
+    <p:extLst>
+      <p:ext uri="{BB962C8B-B14F-4D97-AF65-F5344CB8AC3E}">
+        <p14:creationId xmlns:p14="http://schemas.microsoft.com/office/powerpoint/2010/main" val="289019330"/>
+      </p:ext>
+    </p:extLst>
+  </p:cSld>
+  <p:clrMapOvr>
+    <a:masterClrMapping/>
+  </p:clrMapOvr>
+</p:sld>
+</file>
+
+<file path=ppt/slides/slide14.xml><?xml version="1.0" encoding="utf-8"?>
 <p:sld xmlns:a="http://schemas.openxmlformats.org/drawingml/2006/main" xmlns:r="http://schemas.openxmlformats.org/officeDocument/2006/relationships" xmlns:p="http://schemas.openxmlformats.org/presentationml/2006/main" showMasterSp="0">
   <p:cSld>
     <p:bg>
@@ -5102,7 +5201,7 @@
 </p:sld>
 </file>
 
-<file path=ppt/slides/slide14.xml><?xml version="1.0" encoding="utf-8"?>
+<file path=ppt/slides/slide15.xml><?xml version="1.0" encoding="utf-8"?>
 <p:sld xmlns:a="http://schemas.openxmlformats.org/drawingml/2006/main" xmlns:r="http://schemas.openxmlformats.org/officeDocument/2006/relationships" xmlns:p="http://schemas.openxmlformats.org/presentationml/2006/main">
   <p:cSld>
     <p:bg>
@@ -5186,8 +5285,8 @@
         </p:nvSpPr>
         <p:spPr>
           <a:xfrm>
-            <a:off x="2485748" y="4474346"/>
-            <a:ext cx="8016535" cy="923330"/>
+            <a:off x="2459115" y="4509856"/>
+            <a:ext cx="8016535" cy="646331"/>
           </a:xfrm>
           <a:prstGeom prst="rect">
             <a:avLst/>
@@ -5232,27 +5331,26 @@
             </a:endParaRPr>
           </a:p>
           <a:p>
-            <a:endParaRPr lang="en-IN" dirty="0"/>
-          </a:p>
-          <a:p>
-            <a:r>
-              <a:rPr lang="en-IN" dirty="0"/>
+            <a:r>
+              <a:rPr lang="en-US" sz="1800" b="0" i="0" u="none" strike="noStrike" baseline="0" dirty="0">
+                <a:solidFill>
+                  <a:srgbClr val="000000"/>
+                </a:solidFill>
+                <a:latin typeface="Calibri" panose="020F0502020204030204" pitchFamily="34" charset="0"/>
+              </a:rPr>
               <a:t>Deployed At: </a:t>
             </a:r>
             <a:r>
-              <a:rPr lang="en-IN" dirty="0">
+              <a:rPr lang="en-US" sz="1800" b="0" i="0" u="none" strike="noStrike" baseline="0" dirty="0">
                 <a:solidFill>
-                  <a:srgbClr val="00B0F0"/>
+                  <a:srgbClr val="000000"/>
                 </a:solidFill>
+                <a:latin typeface="Calibri" panose="020F0502020204030204" pitchFamily="34" charset="0"/>
                 <a:hlinkClick r:id="rId3"/>
               </a:rPr>
-              <a:t>https://oa-checkup-system.herokuapp.com/</a:t>
-            </a:r>
-            <a:endParaRPr lang="en-IN" dirty="0">
-              <a:solidFill>
-                <a:srgbClr val="00B0F0"/>
-              </a:solidFill>
-            </a:endParaRPr>
+              <a:t>https://oa-checkup-system.herokuapp.com/ </a:t>
+            </a:r>
+            <a:endParaRPr lang="en-IN" dirty="0"/>
           </a:p>
         </p:txBody>
       </p:sp>
@@ -5439,7 +5537,7 @@
             </a:pPr>
             <a:r>
               <a:rPr lang="en-IN" sz="2400" dirty="0"/>
-              <a:t>Art Effects on X-ray</a:t>
+              <a:t>Artefacts on X-ray</a:t>
             </a:r>
           </a:p>
           <a:p>
@@ -5595,7 +5693,7 @@
         <p:spPr/>
         <p:txBody>
           <a:bodyPr>
-            <a:normAutofit lnSpcReduction="10000"/>
+            <a:normAutofit fontScale="92500" lnSpcReduction="20000"/>
           </a:bodyPr>
           <a:lstStyle/>
           <a:p>
@@ -5650,6 +5748,27 @@
                 <a:solidFill>
                   <a:schemeClr val="tx1"/>
                 </a:solidFill>
+                <a:effectLst/>
+                <a:ea typeface="Times New Roman" panose="02020603050405020304" pitchFamily="18" charset="0"/>
+              </a:rPr>
+              <a:t>User details and Report Management</a:t>
+            </a:r>
+            <a:endParaRPr lang="en-IN" sz="2400" dirty="0">
+              <a:solidFill>
+                <a:schemeClr val="tx1"/>
+              </a:solidFill>
+            </a:endParaRPr>
+          </a:p>
+          <a:p>
+            <a:pPr>
+              <a:buFont typeface="Wingdings" panose="05000000000000000000" pitchFamily="2" charset="2"/>
+              <a:buChar char="v"/>
+            </a:pPr>
+            <a:r>
+              <a:rPr lang="en-IN" sz="2400" dirty="0">
+                <a:solidFill>
+                  <a:schemeClr val="tx1"/>
+                </a:solidFill>
               </a:rPr>
               <a:t>View-Download-Search Patients Report’s based on</a:t>
             </a:r>
@@ -5720,7 +5839,7 @@
                   <a:schemeClr val="tx1"/>
                 </a:solidFill>
               </a:rPr>
-              <a:t>Change System’s Language( 137 languages including Hindi and Punjabi)</a:t>
+              <a:t>Change System’s Language( 108 languages including Hindi and Punjabi)</a:t>
             </a:r>
           </a:p>
           <a:p>

</xml_diff>